<commit_message>
Completed Database implementation Trying to solve Plugin sqlite3 to work in Android (added folder with tries)
</commit_message>
<xml_diff>
--- a/Assets/MockUp.pptx
+++ b/Assets/MockUp.pptx
@@ -268,7 +268,7 @@
           <a:p>
             <a:fld id="{89E302C0-7B6C-4457-AEE2-BC738AF72ED8}" type="datetimeFigureOut">
               <a:rPr lang="es-ES" smtClean="0"/>
-              <a:t>27/07/2022</a:t>
+              <a:t>29/07/2022</a:t>
             </a:fld>
             <a:endParaRPr lang="es-ES"/>
           </a:p>
@@ -468,7 +468,7 @@
           <a:p>
             <a:fld id="{89E302C0-7B6C-4457-AEE2-BC738AF72ED8}" type="datetimeFigureOut">
               <a:rPr lang="es-ES" smtClean="0"/>
-              <a:t>27/07/2022</a:t>
+              <a:t>29/07/2022</a:t>
             </a:fld>
             <a:endParaRPr lang="es-ES"/>
           </a:p>
@@ -678,7 +678,7 @@
           <a:p>
             <a:fld id="{89E302C0-7B6C-4457-AEE2-BC738AF72ED8}" type="datetimeFigureOut">
               <a:rPr lang="es-ES" smtClean="0"/>
-              <a:t>27/07/2022</a:t>
+              <a:t>29/07/2022</a:t>
             </a:fld>
             <a:endParaRPr lang="es-ES"/>
           </a:p>
@@ -878,7 +878,7 @@
           <a:p>
             <a:fld id="{89E302C0-7B6C-4457-AEE2-BC738AF72ED8}" type="datetimeFigureOut">
               <a:rPr lang="es-ES" smtClean="0"/>
-              <a:t>27/07/2022</a:t>
+              <a:t>29/07/2022</a:t>
             </a:fld>
             <a:endParaRPr lang="es-ES"/>
           </a:p>
@@ -1154,7 +1154,7 @@
           <a:p>
             <a:fld id="{89E302C0-7B6C-4457-AEE2-BC738AF72ED8}" type="datetimeFigureOut">
               <a:rPr lang="es-ES" smtClean="0"/>
-              <a:t>27/07/2022</a:t>
+              <a:t>29/07/2022</a:t>
             </a:fld>
             <a:endParaRPr lang="es-ES"/>
           </a:p>
@@ -1422,7 +1422,7 @@
           <a:p>
             <a:fld id="{89E302C0-7B6C-4457-AEE2-BC738AF72ED8}" type="datetimeFigureOut">
               <a:rPr lang="es-ES" smtClean="0"/>
-              <a:t>27/07/2022</a:t>
+              <a:t>29/07/2022</a:t>
             </a:fld>
             <a:endParaRPr lang="es-ES"/>
           </a:p>
@@ -1837,7 +1837,7 @@
           <a:p>
             <a:fld id="{89E302C0-7B6C-4457-AEE2-BC738AF72ED8}" type="datetimeFigureOut">
               <a:rPr lang="es-ES" smtClean="0"/>
-              <a:t>27/07/2022</a:t>
+              <a:t>29/07/2022</a:t>
             </a:fld>
             <a:endParaRPr lang="es-ES"/>
           </a:p>
@@ -1979,7 +1979,7 @@
           <a:p>
             <a:fld id="{89E302C0-7B6C-4457-AEE2-BC738AF72ED8}" type="datetimeFigureOut">
               <a:rPr lang="es-ES" smtClean="0"/>
-              <a:t>27/07/2022</a:t>
+              <a:t>29/07/2022</a:t>
             </a:fld>
             <a:endParaRPr lang="es-ES"/>
           </a:p>
@@ -2092,7 +2092,7 @@
           <a:p>
             <a:fld id="{89E302C0-7B6C-4457-AEE2-BC738AF72ED8}" type="datetimeFigureOut">
               <a:rPr lang="es-ES" smtClean="0"/>
-              <a:t>27/07/2022</a:t>
+              <a:t>29/07/2022</a:t>
             </a:fld>
             <a:endParaRPr lang="es-ES"/>
           </a:p>
@@ -2405,7 +2405,7 @@
           <a:p>
             <a:fld id="{89E302C0-7B6C-4457-AEE2-BC738AF72ED8}" type="datetimeFigureOut">
               <a:rPr lang="es-ES" smtClean="0"/>
-              <a:t>27/07/2022</a:t>
+              <a:t>29/07/2022</a:t>
             </a:fld>
             <a:endParaRPr lang="es-ES"/>
           </a:p>
@@ -2694,7 +2694,7 @@
           <a:p>
             <a:fld id="{89E302C0-7B6C-4457-AEE2-BC738AF72ED8}" type="datetimeFigureOut">
               <a:rPr lang="es-ES" smtClean="0"/>
-              <a:t>27/07/2022</a:t>
+              <a:t>29/07/2022</a:t>
             </a:fld>
             <a:endParaRPr lang="es-ES"/>
           </a:p>
@@ -2937,7 +2937,7 @@
           <a:p>
             <a:fld id="{89E302C0-7B6C-4457-AEE2-BC738AF72ED8}" type="datetimeFigureOut">
               <a:rPr lang="es-ES" smtClean="0"/>
-              <a:t>27/07/2022</a:t>
+              <a:t>29/07/2022</a:t>
             </a:fld>
             <a:endParaRPr lang="es-ES"/>
           </a:p>
@@ -4312,7 +4312,7 @@
       </p:grpSpPr>
       <p:sp>
         <p:nvSpPr>
-          <p:cNvPr id="4" name="Rectangle 3">
+          <p:cNvPr id="4" name="Rectangle 3" hidden="1">
             <a:extLst>
               <a:ext uri="{FF2B5EF4-FFF2-40B4-BE49-F238E27FC236}">
                 <a16:creationId xmlns:a16="http://schemas.microsoft.com/office/drawing/2014/main" id="{23F95DC3-DCF7-4C90-AADB-EFCB1ADF5431}"/>
@@ -5334,7 +5334,7 @@
         </p:nvSpPr>
         <p:spPr>
           <a:xfrm>
-            <a:off x="749713" y="5107016"/>
+            <a:off x="766646" y="5234021"/>
             <a:ext cx="1556003" cy="369332"/>
           </a:xfrm>
           <a:prstGeom prst="rect">
@@ -5369,7 +5369,7 @@
         </p:nvSpPr>
         <p:spPr>
           <a:xfrm>
-            <a:off x="838200" y="5449087"/>
+            <a:off x="855133" y="5593026"/>
             <a:ext cx="3081867" cy="1241639"/>
           </a:xfrm>
           <a:prstGeom prst="rect">
@@ -5413,7 +5413,7 @@
         </p:nvSpPr>
         <p:spPr>
           <a:xfrm>
-            <a:off x="2796115" y="6777119"/>
+            <a:off x="2813048" y="6921058"/>
             <a:ext cx="1123951" cy="362373"/>
           </a:xfrm>
           <a:prstGeom prst="roundRect">
@@ -5877,6 +5877,133 @@
           </a:fillRef>
           <a:effectRef idx="0">
             <a:scrgbClr r="0" g="0" b="0"/>
+          </a:effectRef>
+          <a:fontRef idx="minor">
+            <a:schemeClr val="lt1"/>
+          </a:fontRef>
+        </p:style>
+        <p:txBody>
+          <a:bodyPr rtlCol="0" anchor="ctr"/>
+          <a:lstStyle/>
+          <a:p>
+            <a:pPr algn="ctr"/>
+            <a:endParaRPr lang="es-ES"/>
+          </a:p>
+        </p:txBody>
+      </p:sp>
+      <p:sp>
+        <p:nvSpPr>
+          <p:cNvPr id="50" name="TextBox 49">
+            <a:extLst>
+              <a:ext uri="{FF2B5EF4-FFF2-40B4-BE49-F238E27FC236}">
+                <a16:creationId xmlns:a16="http://schemas.microsoft.com/office/drawing/2014/main" id="{CB297AEA-3D0C-4412-B8E8-D5EDD5AA060E}"/>
+              </a:ext>
+            </a:extLst>
+          </p:cNvPr>
+          <p:cNvSpPr txBox="1"/>
+          <p:nvPr/>
+        </p:nvSpPr>
+        <p:spPr>
+          <a:xfrm>
+            <a:off x="770758" y="4948183"/>
+            <a:ext cx="2621615" cy="369332"/>
+          </a:xfrm>
+          <a:prstGeom prst="rect">
+            <a:avLst/>
+          </a:prstGeom>
+          <a:noFill/>
+        </p:spPr>
+        <p:txBody>
+          <a:bodyPr wrap="none" rtlCol="0">
+            <a:spAutoFit/>
+          </a:bodyPr>
+          <a:lstStyle/>
+          <a:p>
+            <a:r>
+              <a:rPr lang="es-ES" dirty="0"/>
+              <a:t>Has necesitado medicina?</a:t>
+            </a:r>
+          </a:p>
+        </p:txBody>
+      </p:sp>
+      <p:sp>
+        <p:nvSpPr>
+          <p:cNvPr id="3" name="Rectangle 2">
+            <a:extLst>
+              <a:ext uri="{FF2B5EF4-FFF2-40B4-BE49-F238E27FC236}">
+                <a16:creationId xmlns:a16="http://schemas.microsoft.com/office/drawing/2014/main" id="{28D46489-5873-4AB4-8901-389F06E2B0E8}"/>
+              </a:ext>
+            </a:extLst>
+          </p:cNvPr>
+          <p:cNvSpPr/>
+          <p:nvPr/>
+        </p:nvSpPr>
+        <p:spPr>
+          <a:xfrm>
+            <a:off x="3392373" y="5094307"/>
+            <a:ext cx="188897" cy="188897"/>
+          </a:xfrm>
+          <a:prstGeom prst="rect">
+            <a:avLst/>
+          </a:prstGeom>
+        </p:spPr>
+        <p:style>
+          <a:lnRef idx="2">
+            <a:schemeClr val="accent1"/>
+          </a:lnRef>
+          <a:fillRef idx="1">
+            <a:schemeClr val="lt1"/>
+          </a:fillRef>
+          <a:effectRef idx="0">
+            <a:schemeClr val="accent1"/>
+          </a:effectRef>
+          <a:fontRef idx="minor">
+            <a:schemeClr val="dk1"/>
+          </a:fontRef>
+        </p:style>
+        <p:txBody>
+          <a:bodyPr rtlCol="0" anchor="ctr"/>
+          <a:lstStyle/>
+          <a:p>
+            <a:pPr algn="ctr"/>
+            <a:endParaRPr lang="es-ES" dirty="0"/>
+          </a:p>
+        </p:txBody>
+      </p:sp>
+      <p:sp>
+        <p:nvSpPr>
+          <p:cNvPr id="60" name="Multiplication Sign 59">
+            <a:extLst>
+              <a:ext uri="{FF2B5EF4-FFF2-40B4-BE49-F238E27FC236}">
+                <a16:creationId xmlns:a16="http://schemas.microsoft.com/office/drawing/2014/main" id="{AB6C1AB0-61E5-4C2D-8907-B3109D2E3D7C}"/>
+              </a:ext>
+            </a:extLst>
+          </p:cNvPr>
+          <p:cNvSpPr/>
+          <p:nvPr/>
+        </p:nvSpPr>
+        <p:spPr>
+          <a:xfrm>
+            <a:off x="3348946" y="5052679"/>
+            <a:ext cx="282782" cy="283538"/>
+          </a:xfrm>
+          <a:prstGeom prst="mathMultiply">
+            <a:avLst>
+              <a:gd name="adj1" fmla="val 1484"/>
+            </a:avLst>
+          </a:prstGeom>
+        </p:spPr>
+        <p:style>
+          <a:lnRef idx="2">
+            <a:schemeClr val="accent1">
+              <a:shade val="50000"/>
+            </a:schemeClr>
+          </a:lnRef>
+          <a:fillRef idx="1">
+            <a:schemeClr val="accent1"/>
+          </a:fillRef>
+          <a:effectRef idx="0">
+            <a:schemeClr val="accent1"/>
           </a:effectRef>
           <a:fontRef idx="minor">
             <a:schemeClr val="lt1"/>
@@ -12235,6 +12362,41 @@
             <a:r>
               <a:rPr lang="es-ES" dirty="0"/>
               <a:t> </a:t>
+            </a:r>
+          </a:p>
+        </p:txBody>
+      </p:sp>
+      <p:sp>
+        <p:nvSpPr>
+          <p:cNvPr id="44" name="TextBox 43">
+            <a:extLst>
+              <a:ext uri="{FF2B5EF4-FFF2-40B4-BE49-F238E27FC236}">
+                <a16:creationId xmlns:a16="http://schemas.microsoft.com/office/drawing/2014/main" id="{00321BCD-924A-4BE4-968F-52407928D7AB}"/>
+              </a:ext>
+            </a:extLst>
+          </p:cNvPr>
+          <p:cNvSpPr txBox="1"/>
+          <p:nvPr/>
+        </p:nvSpPr>
+        <p:spPr>
+          <a:xfrm>
+            <a:off x="764905" y="3531739"/>
+            <a:ext cx="1154483" cy="369332"/>
+          </a:xfrm>
+          <a:prstGeom prst="rect">
+            <a:avLst/>
+          </a:prstGeom>
+          <a:noFill/>
+        </p:spPr>
+        <p:txBody>
+          <a:bodyPr wrap="none" rtlCol="0">
+            <a:spAutoFit/>
+          </a:bodyPr>
+          <a:lstStyle/>
+          <a:p>
+            <a:r>
+              <a:rPr lang="es-ES" dirty="0"/>
+              <a:t>medicine?</a:t>
             </a:r>
           </a:p>
         </p:txBody>

</xml_diff>